<commit_message>
mark as draft gray-edges.pptx
</commit_message>
<xml_diff>
--- a/spring13/slides13/gray-edges.pptx
+++ b/spring13/slides13/gray-edges.pptx
@@ -1905,13 +1905,13 @@
   <p:clrMapOvr>
     <a:masterClrMapping/>
   </p:clrMapOvr>
-  <mc:AlternateContent xmlns:mc="http://schemas.openxmlformats.org/markup-compatibility/2006">
-    <mc:Choice xmlns:p14="http://schemas.microsoft.com/office/powerpoint/2010/main" Requires="p14">
+  <mc:AlternateContent xmlns:mc="http://schemas.openxmlformats.org/markup-compatibility/2006" xmlns:p14="http://schemas.microsoft.com/office/powerpoint/2010/main">
+    <mc:Choice Requires="p14">
       <p:transition spd="slow" p14:dur="900" advClick="0">
         <p:fade/>
       </p:transition>
     </mc:Choice>
-    <mc:Fallback>
+    <mc:Fallback xmlns="">
       <p:transition xmlns:p14="http://schemas.microsoft.com/office/powerpoint/2010/main" spd="slow" advClick="0">
         <p:fade/>
       </p:transition>
@@ -2085,13 +2085,13 @@
   <p:clrMapOvr>
     <a:masterClrMapping/>
   </p:clrMapOvr>
-  <mc:AlternateContent xmlns:mc="http://schemas.openxmlformats.org/markup-compatibility/2006">
-    <mc:Choice xmlns:p14="http://schemas.microsoft.com/office/powerpoint/2010/main" Requires="p14">
+  <mc:AlternateContent xmlns:mc="http://schemas.openxmlformats.org/markup-compatibility/2006" xmlns:p14="http://schemas.microsoft.com/office/powerpoint/2010/main">
+    <mc:Choice Requires="p14">
       <p:transition spd="slow" p14:dur="900" advClick="0">
         <p:fade/>
       </p:transition>
     </mc:Choice>
-    <mc:Fallback>
+    <mc:Fallback xmlns="">
       <p:transition xmlns:p14="http://schemas.microsoft.com/office/powerpoint/2010/main" spd="slow" advClick="0">
         <p:fade/>
       </p:transition>
@@ -2287,13 +2287,13 @@
   <p:clrMapOvr>
     <a:masterClrMapping/>
   </p:clrMapOvr>
-  <mc:AlternateContent xmlns:mc="http://schemas.openxmlformats.org/markup-compatibility/2006">
-    <mc:Choice xmlns:p14="http://schemas.microsoft.com/office/powerpoint/2010/main" Requires="p14">
+  <mc:AlternateContent xmlns:mc="http://schemas.openxmlformats.org/markup-compatibility/2006" xmlns:p14="http://schemas.microsoft.com/office/powerpoint/2010/main">
+    <mc:Choice Requires="p14">
       <p:transition spd="slow" p14:dur="900" advClick="0">
         <p:fade/>
       </p:transition>
     </mc:Choice>
-    <mc:Fallback>
+    <mc:Fallback xmlns="">
       <p:transition xmlns:p14="http://schemas.microsoft.com/office/powerpoint/2010/main" spd="slow" advClick="0">
         <p:fade/>
       </p:transition>
@@ -2415,13 +2415,13 @@
   <p:clrMapOvr>
     <a:masterClrMapping/>
   </p:clrMapOvr>
-  <mc:AlternateContent xmlns:mc="http://schemas.openxmlformats.org/markup-compatibility/2006">
-    <mc:Choice xmlns:p14="http://schemas.microsoft.com/office/powerpoint/2010/main" Requires="p14">
+  <mc:AlternateContent xmlns:mc="http://schemas.openxmlformats.org/markup-compatibility/2006" xmlns:p14="http://schemas.microsoft.com/office/powerpoint/2010/main">
+    <mc:Choice Requires="p14">
       <p:transition spd="slow" p14:dur="900" advClick="0">
         <p:fade/>
       </p:transition>
     </mc:Choice>
-    <mc:Fallback>
+    <mc:Fallback xmlns="">
       <p:transition xmlns:p14="http://schemas.microsoft.com/office/powerpoint/2010/main" spd="slow" advClick="0">
         <p:fade/>
       </p:transition>
@@ -2520,13 +2520,13 @@
   <p:clrMapOvr>
     <a:masterClrMapping/>
   </p:clrMapOvr>
-  <mc:AlternateContent xmlns:mc="http://schemas.openxmlformats.org/markup-compatibility/2006">
-    <mc:Choice xmlns:p14="http://schemas.microsoft.com/office/powerpoint/2010/main" Requires="p14">
+  <mc:AlternateContent xmlns:mc="http://schemas.openxmlformats.org/markup-compatibility/2006" xmlns:p14="http://schemas.microsoft.com/office/powerpoint/2010/main">
+    <mc:Choice Requires="p14">
       <p:transition spd="slow" p14:dur="900" advClick="0">
         <p:fade/>
       </p:transition>
     </mc:Choice>
-    <mc:Fallback>
+    <mc:Fallback xmlns="">
       <p:transition xmlns:p14="http://schemas.microsoft.com/office/powerpoint/2010/main" spd="slow" advClick="0">
         <p:fade/>
       </p:transition>
@@ -2783,13 +2783,13 @@
   <p:clrMapOvr>
     <a:masterClrMapping/>
   </p:clrMapOvr>
-  <mc:AlternateContent xmlns:mc="http://schemas.openxmlformats.org/markup-compatibility/2006">
-    <mc:Choice xmlns:p14="http://schemas.microsoft.com/office/powerpoint/2010/main" Requires="p14">
+  <mc:AlternateContent xmlns:mc="http://schemas.openxmlformats.org/markup-compatibility/2006" xmlns:p14="http://schemas.microsoft.com/office/powerpoint/2010/main">
+    <mc:Choice Requires="p14">
       <p:transition spd="slow" p14:dur="900" advClick="0">
         <p:fade/>
       </p:transition>
     </mc:Choice>
-    <mc:Fallback>
+    <mc:Fallback xmlns="">
       <p:transition xmlns:p14="http://schemas.microsoft.com/office/powerpoint/2010/main" spd="slow" advClick="0">
         <p:fade/>
       </p:transition>
@@ -3174,13 +3174,13 @@
     <p:sldLayoutId id="2147483657" r:id="rId5"/>
     <p:sldLayoutId id="2147483659" r:id="rId6"/>
   </p:sldLayoutIdLst>
-  <mc:AlternateContent xmlns:mc="http://schemas.openxmlformats.org/markup-compatibility/2006">
-    <mc:Choice xmlns:p14="http://schemas.microsoft.com/office/powerpoint/2010/main" Requires="p14">
+  <mc:AlternateContent xmlns:mc="http://schemas.openxmlformats.org/markup-compatibility/2006" xmlns:p14="http://schemas.microsoft.com/office/powerpoint/2010/main">
+    <mc:Choice Requires="p14">
       <p:transition spd="slow" p14:dur="900" advClick="0">
         <p:fade/>
       </p:transition>
     </mc:Choice>
-    <mc:Fallback>
+    <mc:Fallback xmlns="">
       <p:transition xmlns:p14="http://schemas.microsoft.com/office/powerpoint/2010/main" spd="slow" advClick="0">
         <p:fade/>
       </p:transition>
@@ -3713,7 +3713,7 @@
         <p:spPr bwMode="auto">
           <a:xfrm>
             <a:off x="1719243" y="2169855"/>
-            <a:ext cx="5580925" cy="2800767"/>
+            <a:ext cx="5580925" cy="4154983"/>
           </a:xfrm>
           <a:prstGeom prst="rect">
             <a:avLst/>
@@ -3754,6 +3754,27 @@
                 <a:cs typeface="Arial" charset="0"/>
               </a:rPr>
               <a:t>Lemma</a:t>
+            </a:r>
+          </a:p>
+          <a:p>
+            <a:pPr algn="ctr"/>
+            <a:r>
+              <a:rPr lang="en-US" sz="8800">
+                <a:solidFill>
+                  <a:schemeClr val="tx2"/>
+                </a:solidFill>
+                <a:cs typeface="Arial" charset="0"/>
+              </a:rPr>
+              <a:t>(</a:t>
+            </a:r>
+            <a:r>
+              <a:rPr lang="en-US" sz="8800" smtClean="0">
+                <a:solidFill>
+                  <a:schemeClr val="tx2"/>
+                </a:solidFill>
+                <a:cs typeface="Arial" charset="0"/>
+              </a:rPr>
+              <a:t>draft)</a:t>
             </a:r>
             <a:endParaRPr lang="en-US" sz="8800" dirty="0">
               <a:solidFill>
@@ -3894,11 +3915,11 @@
   <p:clrMapOvr>
     <a:masterClrMapping/>
   </p:clrMapOvr>
-  <mc:AlternateContent xmlns:mc="http://schemas.openxmlformats.org/markup-compatibility/2006">
-    <mc:Choice xmlns:p14="http://schemas.microsoft.com/office/powerpoint/2010/main" Requires="p14">
+  <mc:AlternateContent xmlns:mc="http://schemas.openxmlformats.org/markup-compatibility/2006" xmlns:p14="http://schemas.microsoft.com/office/powerpoint/2010/main">
+    <mc:Choice Requires="p14">
       <p:transition p14:dur="0" advClick="0"/>
     </mc:Choice>
-    <mc:Fallback>
+    <mc:Fallback xmlns="">
       <p:transition xmlns:p14="http://schemas.microsoft.com/office/powerpoint/2010/main" advClick="0"/>
     </mc:Fallback>
   </mc:AlternateContent>
@@ -4048,13 +4069,13 @@
   <p:clrMapOvr>
     <a:masterClrMapping/>
   </p:clrMapOvr>
-  <mc:AlternateContent xmlns:mc="http://schemas.openxmlformats.org/markup-compatibility/2006">
-    <mc:Choice xmlns:p14="http://schemas.microsoft.com/office/powerpoint/2010/main" Requires="p14">
+  <mc:AlternateContent xmlns:mc="http://schemas.openxmlformats.org/markup-compatibility/2006" xmlns:p14="http://schemas.microsoft.com/office/powerpoint/2010/main">
+    <mc:Choice Requires="p14">
       <p:transition spd="slow" p14:dur="900" advClick="0">
         <p:fade/>
       </p:transition>
     </mc:Choice>
-    <mc:Fallback>
+    <mc:Fallback xmlns="">
       <p:transition xmlns:p14="http://schemas.microsoft.com/office/powerpoint/2010/main" spd="slow" advClick="0">
         <p:fade/>
       </p:transition>
@@ -5236,13 +5257,13 @@
   <p:clrMapOvr>
     <a:masterClrMapping/>
   </p:clrMapOvr>
-  <mc:AlternateContent xmlns:mc="http://schemas.openxmlformats.org/markup-compatibility/2006">
-    <mc:Choice xmlns:p14="http://schemas.microsoft.com/office/powerpoint/2010/main" Requires="p14">
+  <mc:AlternateContent xmlns:mc="http://schemas.openxmlformats.org/markup-compatibility/2006" xmlns:p14="http://schemas.microsoft.com/office/powerpoint/2010/main">
+    <mc:Choice Requires="p14">
       <p:transition spd="slow" p14:dur="900" advClick="0">
         <p:fade/>
       </p:transition>
     </mc:Choice>
-    <mc:Fallback>
+    <mc:Fallback xmlns="">
       <p:transition xmlns:p14="http://schemas.microsoft.com/office/powerpoint/2010/main" spd="slow" advClick="0">
         <p:fade/>
       </p:transition>
@@ -6277,13 +6298,13 @@
   <p:clrMapOvr>
     <a:masterClrMapping/>
   </p:clrMapOvr>
-  <mc:AlternateContent xmlns:mc="http://schemas.openxmlformats.org/markup-compatibility/2006">
-    <mc:Choice xmlns:p14="http://schemas.microsoft.com/office/powerpoint/2010/main" Requires="p14">
+  <mc:AlternateContent xmlns:mc="http://schemas.openxmlformats.org/markup-compatibility/2006" xmlns:p14="http://schemas.microsoft.com/office/powerpoint/2010/main">
+    <mc:Choice Requires="p14">
       <p:transition spd="slow" p14:dur="900" advClick="0">
         <p:fade/>
       </p:transition>
     </mc:Choice>
-    <mc:Fallback>
+    <mc:Fallback xmlns="">
       <p:transition xmlns:p14="http://schemas.microsoft.com/office/powerpoint/2010/main" spd="slow" advClick="0">
         <p:fade/>
       </p:transition>
@@ -6425,13 +6446,13 @@
   <p:clrMapOvr>
     <a:masterClrMapping/>
   </p:clrMapOvr>
-  <mc:AlternateContent xmlns:mc="http://schemas.openxmlformats.org/markup-compatibility/2006">
-    <mc:Choice xmlns:p14="http://schemas.microsoft.com/office/powerpoint/2010/main" Requires="p14">
+  <mc:AlternateContent xmlns:mc="http://schemas.openxmlformats.org/markup-compatibility/2006" xmlns:p14="http://schemas.microsoft.com/office/powerpoint/2010/main">
+    <mc:Choice Requires="p14">
       <p:transition spd="slow" p14:dur="900" advClick="0">
         <p:fade/>
       </p:transition>
     </mc:Choice>
-    <mc:Fallback>
+    <mc:Fallback xmlns="">
       <p:transition xmlns:p14="http://schemas.microsoft.com/office/powerpoint/2010/main" spd="slow" advClick="0">
         <p:fade/>
       </p:transition>
@@ -6586,13 +6607,13 @@
   <p:clrMapOvr>
     <a:masterClrMapping/>
   </p:clrMapOvr>
-  <mc:AlternateContent xmlns:mc="http://schemas.openxmlformats.org/markup-compatibility/2006">
-    <mc:Choice xmlns:p14="http://schemas.microsoft.com/office/powerpoint/2010/main" Requires="p14">
+  <mc:AlternateContent xmlns:mc="http://schemas.openxmlformats.org/markup-compatibility/2006" xmlns:p14="http://schemas.microsoft.com/office/powerpoint/2010/main">
+    <mc:Choice Requires="p14">
       <p:transition spd="slow" p14:dur="900" advClick="0">
         <p:fade/>
       </p:transition>
     </mc:Choice>
-    <mc:Fallback>
+    <mc:Fallback xmlns="">
       <p:transition xmlns:p14="http://schemas.microsoft.com/office/powerpoint/2010/main" spd="slow" advClick="0">
         <p:fade/>
       </p:transition>
@@ -6750,13 +6771,13 @@
   <p:clrMapOvr>
     <a:masterClrMapping/>
   </p:clrMapOvr>
-  <mc:AlternateContent xmlns:mc="http://schemas.openxmlformats.org/markup-compatibility/2006">
-    <mc:Choice xmlns:p14="http://schemas.microsoft.com/office/powerpoint/2010/main" Requires="p14">
+  <mc:AlternateContent xmlns:mc="http://schemas.openxmlformats.org/markup-compatibility/2006" xmlns:p14="http://schemas.microsoft.com/office/powerpoint/2010/main">
+    <mc:Choice Requires="p14">
       <p:transition spd="slow" p14:dur="900" advClick="0">
         <p:fade/>
       </p:transition>
     </mc:Choice>
-    <mc:Fallback>
+    <mc:Fallback xmlns="">
       <p:transition xmlns:p14="http://schemas.microsoft.com/office/powerpoint/2010/main" spd="slow" advClick="0">
         <p:fade/>
       </p:transition>
@@ -6938,13 +6959,13 @@
   <p:clrMapOvr>
     <a:masterClrMapping/>
   </p:clrMapOvr>
-  <mc:AlternateContent xmlns:mc="http://schemas.openxmlformats.org/markup-compatibility/2006">
-    <mc:Choice xmlns:p14="http://schemas.microsoft.com/office/powerpoint/2010/main" Requires="p14">
+  <mc:AlternateContent xmlns:mc="http://schemas.openxmlformats.org/markup-compatibility/2006" xmlns:p14="http://schemas.microsoft.com/office/powerpoint/2010/main">
+    <mc:Choice Requires="p14">
       <p:transition spd="slow" p14:dur="900" advClick="0">
         <p:fade/>
       </p:transition>
     </mc:Choice>
-    <mc:Fallback>
+    <mc:Fallback xmlns="">
       <p:transition xmlns:p14="http://schemas.microsoft.com/office/powerpoint/2010/main" spd="slow" advClick="0">
         <p:fade/>
       </p:transition>
@@ -7234,13 +7255,13 @@
   <p:clrMapOvr>
     <a:masterClrMapping/>
   </p:clrMapOvr>
-  <mc:AlternateContent xmlns:mc="http://schemas.openxmlformats.org/markup-compatibility/2006">
-    <mc:Choice xmlns:p14="http://schemas.microsoft.com/office/powerpoint/2010/main" Requires="p14">
+  <mc:AlternateContent xmlns:mc="http://schemas.openxmlformats.org/markup-compatibility/2006" xmlns:p14="http://schemas.microsoft.com/office/powerpoint/2010/main">
+    <mc:Choice Requires="p14">
       <p:transition spd="slow" p14:dur="900" advClick="0">
         <p:fade/>
       </p:transition>
     </mc:Choice>
-    <mc:Fallback>
+    <mc:Fallback xmlns="">
       <p:transition xmlns:p14="http://schemas.microsoft.com/office/powerpoint/2010/main" spd="slow" advClick="0">
         <p:fade/>
       </p:transition>
@@ -7448,11 +7469,7 @@
             </a:br>
             <a:r>
               <a:rPr lang="en-US" b="0" dirty="0" smtClean="0"/>
-              <a:t>Removing </a:t>
-            </a:r>
-            <a:r>
-              <a:rPr lang="en-US" b="0" dirty="0" smtClean="0"/>
-              <a:t>any edge on that cycle yields another spanning tree</a:t>
+              <a:t>Removing any edge on that cycle yields another spanning tree</a:t>
             </a:r>
             <a:endParaRPr lang="en-US" b="0" dirty="0"/>
           </a:p>
@@ -9138,13 +9155,13 @@
   <p:clrMapOvr>
     <a:masterClrMapping/>
   </p:clrMapOvr>
-  <mc:AlternateContent xmlns:mc="http://schemas.openxmlformats.org/markup-compatibility/2006">
-    <mc:Choice xmlns:p14="http://schemas.microsoft.com/office/powerpoint/2010/main" Requires="p14">
+  <mc:AlternateContent xmlns:mc="http://schemas.openxmlformats.org/markup-compatibility/2006" xmlns:p14="http://schemas.microsoft.com/office/powerpoint/2010/main">
+    <mc:Choice Requires="p14">
       <p:transition spd="slow" p14:dur="900" advClick="0">
         <p:fade/>
       </p:transition>
     </mc:Choice>
-    <mc:Fallback>
+    <mc:Fallback xmlns="">
       <p:transition xmlns:p14="http://schemas.microsoft.com/office/powerpoint/2010/main" spd="slow" advClick="0">
         <p:fade/>
       </p:transition>
@@ -10261,13 +10278,13 @@
   <p:clrMapOvr>
     <a:masterClrMapping/>
   </p:clrMapOvr>
-  <mc:AlternateContent xmlns:mc="http://schemas.openxmlformats.org/markup-compatibility/2006">
-    <mc:Choice xmlns:p14="http://schemas.microsoft.com/office/powerpoint/2010/main" Requires="p14">
+  <mc:AlternateContent xmlns:mc="http://schemas.openxmlformats.org/markup-compatibility/2006" xmlns:p14="http://schemas.microsoft.com/office/powerpoint/2010/main">
+    <mc:Choice Requires="p14">
       <p:transition spd="slow" p14:dur="900" advClick="0">
         <p:fade/>
       </p:transition>
     </mc:Choice>
-    <mc:Fallback>
+    <mc:Fallback xmlns="">
       <p:transition xmlns:p14="http://schemas.microsoft.com/office/powerpoint/2010/main" spd="slow" advClick="0">
         <p:fade/>
       </p:transition>
@@ -11558,13 +11575,13 @@
   <p:clrMapOvr>
     <a:masterClrMapping/>
   </p:clrMapOvr>
-  <mc:AlternateContent xmlns:mc="http://schemas.openxmlformats.org/markup-compatibility/2006">
-    <mc:Choice xmlns:p14="http://schemas.microsoft.com/office/powerpoint/2010/main" Requires="p14">
+  <mc:AlternateContent xmlns:mc="http://schemas.openxmlformats.org/markup-compatibility/2006" xmlns:p14="http://schemas.microsoft.com/office/powerpoint/2010/main">
+    <mc:Choice Requires="p14">
       <p:transition spd="slow" p14:dur="900" advClick="0">
         <p:fade/>
       </p:transition>
     </mc:Choice>
-    <mc:Fallback>
+    <mc:Fallback xmlns="">
       <p:transition xmlns:p14="http://schemas.microsoft.com/office/powerpoint/2010/main" spd="slow" advClick="0">
         <p:fade/>
       </p:transition>
@@ -13442,13 +13459,13 @@
   <p:clrMapOvr>
     <a:masterClrMapping/>
   </p:clrMapOvr>
-  <mc:AlternateContent xmlns:mc="http://schemas.openxmlformats.org/markup-compatibility/2006">
-    <mc:Choice xmlns:p14="http://schemas.microsoft.com/office/powerpoint/2010/main" Requires="p14">
+  <mc:AlternateContent xmlns:mc="http://schemas.openxmlformats.org/markup-compatibility/2006" xmlns:p14="http://schemas.microsoft.com/office/powerpoint/2010/main">
+    <mc:Choice Requires="p14">
       <p:transition spd="slow" p14:dur="900" advClick="0">
         <p:fade/>
       </p:transition>
     </mc:Choice>
-    <mc:Fallback>
+    <mc:Fallback xmlns="">
       <p:transition xmlns:p14="http://schemas.microsoft.com/office/powerpoint/2010/main" spd="slow" advClick="0">
         <p:fade/>
       </p:transition>
@@ -15135,13 +15152,13 @@
   <p:clrMapOvr>
     <a:masterClrMapping/>
   </p:clrMapOvr>
-  <mc:AlternateContent xmlns:mc="http://schemas.openxmlformats.org/markup-compatibility/2006">
-    <mc:Choice xmlns:p14="http://schemas.microsoft.com/office/powerpoint/2010/main" Requires="p14">
+  <mc:AlternateContent xmlns:mc="http://schemas.openxmlformats.org/markup-compatibility/2006" xmlns:p14="http://schemas.microsoft.com/office/powerpoint/2010/main">
+    <mc:Choice Requires="p14">
       <p:transition spd="slow" p14:dur="900" advClick="0">
         <p:fade/>
       </p:transition>
     </mc:Choice>
-    <mc:Fallback>
+    <mc:Fallback xmlns="">
       <p:transition xmlns:p14="http://schemas.microsoft.com/office/powerpoint/2010/main" spd="slow" advClick="0">
         <p:fade/>
       </p:transition>
@@ -15368,13 +15385,13 @@
   <p:clrMapOvr>
     <a:masterClrMapping/>
   </p:clrMapOvr>
-  <mc:AlternateContent xmlns:mc="http://schemas.openxmlformats.org/markup-compatibility/2006">
-    <mc:Choice xmlns:p14="http://schemas.microsoft.com/office/powerpoint/2010/main" Requires="p14">
+  <mc:AlternateContent xmlns:mc="http://schemas.openxmlformats.org/markup-compatibility/2006" xmlns:p14="http://schemas.microsoft.com/office/powerpoint/2010/main">
+    <mc:Choice Requires="p14">
       <p:transition spd="slow" p14:dur="900" advClick="0">
         <p:fade/>
       </p:transition>
     </mc:Choice>
-    <mc:Fallback>
+    <mc:Fallback xmlns="">
       <p:transition xmlns:p14="http://schemas.microsoft.com/office/powerpoint/2010/main" spd="slow" advClick="0">
         <p:fade/>
       </p:transition>
@@ -15671,13 +15688,13 @@
   <p:clrMapOvr>
     <a:masterClrMapping/>
   </p:clrMapOvr>
-  <mc:AlternateContent xmlns:mc="http://schemas.openxmlformats.org/markup-compatibility/2006">
-    <mc:Choice xmlns:p14="http://schemas.microsoft.com/office/powerpoint/2010/main" Requires="p14">
+  <mc:AlternateContent xmlns:mc="http://schemas.openxmlformats.org/markup-compatibility/2006" xmlns:p14="http://schemas.microsoft.com/office/powerpoint/2010/main">
+    <mc:Choice Requires="p14">
       <p:transition spd="slow" p14:dur="900" advClick="0">
         <p:fade/>
       </p:transition>
     </mc:Choice>
-    <mc:Fallback>
+    <mc:Fallback xmlns="">
       <p:transition xmlns:p14="http://schemas.microsoft.com/office/powerpoint/2010/main" spd="slow" advClick="0">
         <p:fade/>
       </p:transition>

</xml_diff>